<commit_message>
feat: update ref arch graph
</commit_message>
<xml_diff>
--- a/architecture-diagram.pptx
+++ b/architecture-diagram.pptx
@@ -5196,7 +5196,7 @@
         </p:nvSpPr>
         <p:spPr bwMode="auto">
           <a:xfrm>
-            <a:off x="8989838" y="5806372"/>
+            <a:off x="8993634" y="4425879"/>
             <a:ext cx="1244022" cy="397032"/>
           </a:xfrm>
           <a:prstGeom prst="rect">
@@ -5381,7 +5381,7 @@
         </p:blipFill>
         <p:spPr bwMode="auto">
           <a:xfrm>
-            <a:off x="9411177" y="5380744"/>
+            <a:off x="9390538" y="3957360"/>
             <a:ext cx="411341" cy="411341"/>
           </a:xfrm>
           <a:prstGeom prst="rect">
@@ -6367,7 +6367,7 @@
         <p:spPr>
           <a:xfrm>
             <a:off x="8762405" y="707769"/>
-            <a:ext cx="1706480" cy="6090962"/>
+            <a:ext cx="1706480" cy="4115142"/>
           </a:xfrm>
           <a:prstGeom prst="rect">
             <a:avLst/>
@@ -6496,12 +6496,14 @@
           <p:nvPr/>
         </p:nvCxnSpPr>
         <p:spPr>
-          <a:xfrm>
-            <a:off x="5513736" y="5583184"/>
-            <a:ext cx="3897441" cy="3231"/>
-          </a:xfrm>
-          <a:prstGeom prst="straightConnector1">
-            <a:avLst/>
+          <a:xfrm flipV="1">
+            <a:off x="5513736" y="4163031"/>
+            <a:ext cx="3876802" cy="1420153"/>
+          </a:xfrm>
+          <a:prstGeom prst="bentConnector3">
+            <a:avLst>
+              <a:gd name="adj1" fmla="val 75922"/>
+            </a:avLst>
           </a:prstGeom>
           <a:ln w="22225">
             <a:solidFill>
@@ -7687,6 +7689,263 @@
           </a:xfrm>
           <a:prstGeom prst="straightConnector1">
             <a:avLst/>
+          </a:prstGeom>
+          <a:ln w="22225">
+            <a:solidFill>
+              <a:srgbClr val="545B64"/>
+            </a:solidFill>
+            <a:headEnd type="none" w="med" len="sm"/>
+            <a:tailEnd type="arrow" w="med" len="sm"/>
+          </a:ln>
+        </p:spPr>
+        <p:style>
+          <a:lnRef idx="1">
+            <a:schemeClr val="accent1"/>
+          </a:lnRef>
+          <a:fillRef idx="0">
+            <a:schemeClr val="accent1"/>
+          </a:fillRef>
+          <a:effectRef idx="0">
+            <a:schemeClr val="accent1"/>
+          </a:effectRef>
+          <a:fontRef idx="minor">
+            <a:schemeClr val="tx1"/>
+          </a:fontRef>
+        </p:style>
+      </p:cxnSp>
+      <p:sp>
+        <p:nvSpPr>
+          <p:cNvPr id="80" name="Rectangle 79">
+            <a:extLst>
+              <a:ext uri="{FF2B5EF4-FFF2-40B4-BE49-F238E27FC236}">
+                <a16:creationId xmlns:a16="http://schemas.microsoft.com/office/drawing/2014/main" id="{97C08657-4001-4F40-A40F-219D82091005}"/>
+              </a:ext>
+            </a:extLst>
+          </p:cNvPr>
+          <p:cNvSpPr/>
+          <p:nvPr/>
+        </p:nvSpPr>
+        <p:spPr>
+          <a:xfrm>
+            <a:off x="8762404" y="4890411"/>
+            <a:ext cx="1706480" cy="1908320"/>
+          </a:xfrm>
+          <a:prstGeom prst="rect">
+            <a:avLst/>
+          </a:prstGeom>
+          <a:noFill/>
+          <a:ln w="12700">
+            <a:solidFill>
+              <a:srgbClr val="3F8624"/>
+            </a:solidFill>
+          </a:ln>
+        </p:spPr>
+        <p:style>
+          <a:lnRef idx="2">
+            <a:schemeClr val="accent1">
+              <a:shade val="50000"/>
+            </a:schemeClr>
+          </a:lnRef>
+          <a:fillRef idx="1">
+            <a:schemeClr val="accent1"/>
+          </a:fillRef>
+          <a:effectRef idx="0">
+            <a:schemeClr val="accent1"/>
+          </a:effectRef>
+          <a:fontRef idx="minor">
+            <a:schemeClr val="lt1"/>
+          </a:fontRef>
+        </p:style>
+        <p:txBody>
+          <a:bodyPr lIns="421058" tIns="82268"/>
+          <a:lstStyle/>
+          <a:p>
+            <a:pPr>
+              <a:defRPr/>
+            </a:pPr>
+            <a:r>
+              <a:rPr lang="en-US" sz="1080" dirty="0">
+                <a:ln w="0"/>
+                <a:solidFill>
+                  <a:srgbClr val="3F8624"/>
+                </a:solidFill>
+                <a:latin typeface="Arial" panose="020B0604020202020204" pitchFamily="34" charset="0"/>
+                <a:cs typeface="Arial" panose="020B0604020202020204" pitchFamily="34" charset="0"/>
+              </a:rPr>
+              <a:t>Amazon Elastic File System (Amazon EFS)</a:t>
+            </a:r>
+          </a:p>
+        </p:txBody>
+      </p:sp>
+      <p:pic>
+        <p:nvPicPr>
+          <p:cNvPr id="17" name="Picture 16">
+            <a:extLst>
+              <a:ext uri="{FF2B5EF4-FFF2-40B4-BE49-F238E27FC236}">
+                <a16:creationId xmlns:a16="http://schemas.microsoft.com/office/drawing/2014/main" id="{7ABB00BB-7EC7-4F22-9982-1FA513B6FFF3}"/>
+              </a:ext>
+            </a:extLst>
+          </p:cNvPr>
+          <p:cNvPicPr>
+            <a:picLocks noChangeAspect="1"/>
+          </p:cNvPicPr>
+          <p:nvPr/>
+        </p:nvPicPr>
+        <p:blipFill>
+          <a:blip r:embed="rId27"/>
+          <a:stretch>
+            <a:fillRect/>
+          </a:stretch>
+        </p:blipFill>
+        <p:spPr>
+          <a:xfrm>
+            <a:off x="8771069" y="4893708"/>
+            <a:ext cx="331449" cy="334902"/>
+          </a:xfrm>
+          <a:prstGeom prst="rect">
+            <a:avLst/>
+          </a:prstGeom>
+        </p:spPr>
+      </p:pic>
+      <p:pic>
+        <p:nvPicPr>
+          <p:cNvPr id="22" name="Picture 21">
+            <a:extLst>
+              <a:ext uri="{FF2B5EF4-FFF2-40B4-BE49-F238E27FC236}">
+                <a16:creationId xmlns:a16="http://schemas.microsoft.com/office/drawing/2014/main" id="{0E8558EB-FA29-4AE2-9768-5CB741E87DA8}"/>
+              </a:ext>
+            </a:extLst>
+          </p:cNvPr>
+          <p:cNvPicPr>
+            <a:picLocks noChangeAspect="1"/>
+          </p:cNvPicPr>
+          <p:nvPr/>
+        </p:nvPicPr>
+        <p:blipFill>
+          <a:blip r:embed="rId28"/>
+          <a:stretch>
+            <a:fillRect/>
+          </a:stretch>
+        </p:blipFill>
+        <p:spPr>
+          <a:xfrm>
+            <a:off x="9273643" y="5618019"/>
+            <a:ext cx="657225" cy="581025"/>
+          </a:xfrm>
+          <a:prstGeom prst="rect">
+            <a:avLst/>
+          </a:prstGeom>
+        </p:spPr>
+      </p:pic>
+      <p:sp>
+        <p:nvSpPr>
+          <p:cNvPr id="26" name="TextBox 25">
+            <a:extLst>
+              <a:ext uri="{FF2B5EF4-FFF2-40B4-BE49-F238E27FC236}">
+                <a16:creationId xmlns:a16="http://schemas.microsoft.com/office/drawing/2014/main" id="{3C673CF6-75ED-4618-978C-98C4BB0D60BC}"/>
+              </a:ext>
+            </a:extLst>
+          </p:cNvPr>
+          <p:cNvSpPr txBox="1"/>
+          <p:nvPr/>
+        </p:nvSpPr>
+        <p:spPr>
+          <a:xfrm>
+            <a:off x="9201106" y="6195410"/>
+            <a:ext cx="829073" cy="244682"/>
+          </a:xfrm>
+          <a:prstGeom prst="rect">
+            <a:avLst/>
+          </a:prstGeom>
+          <a:noFill/>
+        </p:spPr>
+        <p:txBody>
+          <a:bodyPr wrap="none" rtlCol="0">
+            <a:spAutoFit/>
+          </a:bodyPr>
+          <a:lstStyle/>
+          <a:p>
+            <a:r>
+              <a:rPr lang="en-US" sz="990" dirty="0">
+                <a:latin typeface="Arial" panose="020B0604020202020204" pitchFamily="34" charset="0"/>
+                <a:cs typeface="Arial" panose="020B0604020202020204" pitchFamily="34" charset="0"/>
+              </a:rPr>
+              <a:t>File system</a:t>
+            </a:r>
+          </a:p>
+        </p:txBody>
+      </p:sp>
+      <p:cxnSp>
+        <p:nvCxnSpPr>
+          <p:cNvPr id="83" name="Straight Arrow Connector 39">
+            <a:extLst>
+              <a:ext uri="{FF2B5EF4-FFF2-40B4-BE49-F238E27FC236}">
+                <a16:creationId xmlns:a16="http://schemas.microsoft.com/office/drawing/2014/main" id="{7A2CAB87-B593-46EA-BA69-9A0F641C7B14}"/>
+              </a:ext>
+            </a:extLst>
+          </p:cNvPr>
+          <p:cNvCxnSpPr>
+            <a:cxnSpLocks/>
+          </p:cNvCxnSpPr>
+          <p:nvPr/>
+        </p:nvCxnSpPr>
+        <p:spPr>
+          <a:xfrm>
+            <a:off x="6082379" y="4513849"/>
+            <a:ext cx="3190402" cy="1618459"/>
+          </a:xfrm>
+          <a:prstGeom prst="bentConnector3">
+            <a:avLst>
+              <a:gd name="adj1" fmla="val 8569"/>
+            </a:avLst>
+          </a:prstGeom>
+          <a:ln w="22225">
+            <a:solidFill>
+              <a:srgbClr val="545B64"/>
+            </a:solidFill>
+            <a:headEnd type="none" w="med" len="sm"/>
+            <a:tailEnd type="arrow" w="med" len="sm"/>
+          </a:ln>
+        </p:spPr>
+        <p:style>
+          <a:lnRef idx="1">
+            <a:schemeClr val="accent1"/>
+          </a:lnRef>
+          <a:fillRef idx="0">
+            <a:schemeClr val="accent1"/>
+          </a:fillRef>
+          <a:effectRef idx="0">
+            <a:schemeClr val="accent1"/>
+          </a:effectRef>
+          <a:fontRef idx="minor">
+            <a:schemeClr val="tx1"/>
+          </a:fontRef>
+        </p:style>
+      </p:cxnSp>
+      <p:cxnSp>
+        <p:nvCxnSpPr>
+          <p:cNvPr id="84" name="Straight Arrow Connector 39">
+            <a:extLst>
+              <a:ext uri="{FF2B5EF4-FFF2-40B4-BE49-F238E27FC236}">
+                <a16:creationId xmlns:a16="http://schemas.microsoft.com/office/drawing/2014/main" id="{587912E3-CA74-4546-A5B5-20A7668127A7}"/>
+              </a:ext>
+            </a:extLst>
+          </p:cNvPr>
+          <p:cNvCxnSpPr>
+            <a:cxnSpLocks/>
+            <a:endCxn id="22" idx="1"/>
+          </p:cNvCxnSpPr>
+          <p:nvPr/>
+        </p:nvCxnSpPr>
+        <p:spPr>
+          <a:xfrm>
+            <a:off x="6108255" y="3468281"/>
+            <a:ext cx="3165388" cy="2440251"/>
+          </a:xfrm>
+          <a:prstGeom prst="bentConnector3">
+            <a:avLst>
+              <a:gd name="adj1" fmla="val 11102"/>
+            </a:avLst>
           </a:prstGeom>
           <a:ln w="22225">
             <a:solidFill>

</xml_diff>

<commit_message>
feat: update arch graph
</commit_message>
<xml_diff>
--- a/architecture-diagram.pptx
+++ b/architecture-diagram.pptx
@@ -243,7 +243,7 @@
           <a:p>
             <a:fld id="{1A118ADA-5B78-4A85-B206-8676330FD0AF}" type="datetimeFigureOut">
               <a:rPr lang="de-DE" smtClean="0"/>
-              <a:t>05.06.2023</a:t>
+              <a:t>06.06.2023</a:t>
             </a:fld>
             <a:endParaRPr lang="de-DE"/>
           </a:p>
@@ -413,7 +413,7 @@
           <a:p>
             <a:fld id="{1A118ADA-5B78-4A85-B206-8676330FD0AF}" type="datetimeFigureOut">
               <a:rPr lang="de-DE" smtClean="0"/>
-              <a:t>05.06.2023</a:t>
+              <a:t>06.06.2023</a:t>
             </a:fld>
             <a:endParaRPr lang="de-DE"/>
           </a:p>
@@ -593,7 +593,7 @@
           <a:p>
             <a:fld id="{1A118ADA-5B78-4A85-B206-8676330FD0AF}" type="datetimeFigureOut">
               <a:rPr lang="de-DE" smtClean="0"/>
-              <a:t>05.06.2023</a:t>
+              <a:t>06.06.2023</a:t>
             </a:fld>
             <a:endParaRPr lang="de-DE"/>
           </a:p>
@@ -763,7 +763,7 @@
           <a:p>
             <a:fld id="{1A118ADA-5B78-4A85-B206-8676330FD0AF}" type="datetimeFigureOut">
               <a:rPr lang="de-DE" smtClean="0"/>
-              <a:t>05.06.2023</a:t>
+              <a:t>06.06.2023</a:t>
             </a:fld>
             <a:endParaRPr lang="de-DE"/>
           </a:p>
@@ -1007,7 +1007,7 @@
           <a:p>
             <a:fld id="{1A118ADA-5B78-4A85-B206-8676330FD0AF}" type="datetimeFigureOut">
               <a:rPr lang="de-DE" smtClean="0"/>
-              <a:t>05.06.2023</a:t>
+              <a:t>06.06.2023</a:t>
             </a:fld>
             <a:endParaRPr lang="de-DE"/>
           </a:p>
@@ -1239,7 +1239,7 @@
           <a:p>
             <a:fld id="{1A118ADA-5B78-4A85-B206-8676330FD0AF}" type="datetimeFigureOut">
               <a:rPr lang="de-DE" smtClean="0"/>
-              <a:t>05.06.2023</a:t>
+              <a:t>06.06.2023</a:t>
             </a:fld>
             <a:endParaRPr lang="de-DE"/>
           </a:p>
@@ -1606,7 +1606,7 @@
           <a:p>
             <a:fld id="{1A118ADA-5B78-4A85-B206-8676330FD0AF}" type="datetimeFigureOut">
               <a:rPr lang="de-DE" smtClean="0"/>
-              <a:t>05.06.2023</a:t>
+              <a:t>06.06.2023</a:t>
             </a:fld>
             <a:endParaRPr lang="de-DE"/>
           </a:p>
@@ -1724,7 +1724,7 @@
           <a:p>
             <a:fld id="{1A118ADA-5B78-4A85-B206-8676330FD0AF}" type="datetimeFigureOut">
               <a:rPr lang="de-DE" smtClean="0"/>
-              <a:t>05.06.2023</a:t>
+              <a:t>06.06.2023</a:t>
             </a:fld>
             <a:endParaRPr lang="de-DE"/>
           </a:p>
@@ -1819,7 +1819,7 @@
           <a:p>
             <a:fld id="{1A118ADA-5B78-4A85-B206-8676330FD0AF}" type="datetimeFigureOut">
               <a:rPr lang="de-DE" smtClean="0"/>
-              <a:t>05.06.2023</a:t>
+              <a:t>06.06.2023</a:t>
             </a:fld>
             <a:endParaRPr lang="de-DE"/>
           </a:p>
@@ -2096,7 +2096,7 @@
           <a:p>
             <a:fld id="{1A118ADA-5B78-4A85-B206-8676330FD0AF}" type="datetimeFigureOut">
               <a:rPr lang="de-DE" smtClean="0"/>
-              <a:t>05.06.2023</a:t>
+              <a:t>06.06.2023</a:t>
             </a:fld>
             <a:endParaRPr lang="de-DE"/>
           </a:p>
@@ -2353,7 +2353,7 @@
           <a:p>
             <a:fld id="{1A118ADA-5B78-4A85-B206-8676330FD0AF}" type="datetimeFigureOut">
               <a:rPr lang="de-DE" smtClean="0"/>
-              <a:t>05.06.2023</a:t>
+              <a:t>06.06.2023</a:t>
             </a:fld>
             <a:endParaRPr lang="de-DE"/>
           </a:p>
@@ -2566,7 +2566,7 @@
           <a:p>
             <a:fld id="{1A118ADA-5B78-4A85-B206-8676330FD0AF}" type="datetimeFigureOut">
               <a:rPr lang="de-DE" smtClean="0"/>
-              <a:t>05.06.2023</a:t>
+              <a:t>06.06.2023</a:t>
             </a:fld>
             <a:endParaRPr lang="de-DE"/>
           </a:p>
@@ -7763,115 +7763,14 @@
             <a:pPr>
               <a:defRPr/>
             </a:pPr>
-            <a:r>
-              <a:rPr lang="en-US" sz="1080" dirty="0">
-                <a:ln w="0"/>
-                <a:solidFill>
-                  <a:srgbClr val="3F8624"/>
-                </a:solidFill>
-                <a:latin typeface="Arial" panose="020B0604020202020204" pitchFamily="34" charset="0"/>
-                <a:cs typeface="Arial" panose="020B0604020202020204" pitchFamily="34" charset="0"/>
-              </a:rPr>
-              <a:t>Amazon Elastic File System (Amazon EFS)</a:t>
-            </a:r>
-          </a:p>
-        </p:txBody>
-      </p:sp>
-      <p:pic>
-        <p:nvPicPr>
-          <p:cNvPr id="17" name="Picture 16">
-            <a:extLst>
-              <a:ext uri="{FF2B5EF4-FFF2-40B4-BE49-F238E27FC236}">
-                <a16:creationId xmlns:a16="http://schemas.microsoft.com/office/drawing/2014/main" id="{7ABB00BB-7EC7-4F22-9982-1FA513B6FFF3}"/>
-              </a:ext>
-            </a:extLst>
-          </p:cNvPr>
-          <p:cNvPicPr>
-            <a:picLocks noChangeAspect="1"/>
-          </p:cNvPicPr>
-          <p:nvPr/>
-        </p:nvPicPr>
-        <p:blipFill>
-          <a:blip r:embed="rId27"/>
-          <a:stretch>
-            <a:fillRect/>
-          </a:stretch>
-        </p:blipFill>
-        <p:spPr>
-          <a:xfrm>
-            <a:off x="8771069" y="4893708"/>
-            <a:ext cx="331449" cy="334902"/>
-          </a:xfrm>
-          <a:prstGeom prst="rect">
-            <a:avLst/>
-          </a:prstGeom>
-        </p:spPr>
-      </p:pic>
-      <p:pic>
-        <p:nvPicPr>
-          <p:cNvPr id="22" name="Picture 21">
-            <a:extLst>
-              <a:ext uri="{FF2B5EF4-FFF2-40B4-BE49-F238E27FC236}">
-                <a16:creationId xmlns:a16="http://schemas.microsoft.com/office/drawing/2014/main" id="{0E8558EB-FA29-4AE2-9768-5CB741E87DA8}"/>
-              </a:ext>
-            </a:extLst>
-          </p:cNvPr>
-          <p:cNvPicPr>
-            <a:picLocks noChangeAspect="1"/>
-          </p:cNvPicPr>
-          <p:nvPr/>
-        </p:nvPicPr>
-        <p:blipFill>
-          <a:blip r:embed="rId28"/>
-          <a:stretch>
-            <a:fillRect/>
-          </a:stretch>
-        </p:blipFill>
-        <p:spPr>
-          <a:xfrm>
-            <a:off x="9273643" y="5618019"/>
-            <a:ext cx="657225" cy="581025"/>
-          </a:xfrm>
-          <a:prstGeom prst="rect">
-            <a:avLst/>
-          </a:prstGeom>
-        </p:spPr>
-      </p:pic>
-      <p:sp>
-        <p:nvSpPr>
-          <p:cNvPr id="26" name="TextBox 25">
-            <a:extLst>
-              <a:ext uri="{FF2B5EF4-FFF2-40B4-BE49-F238E27FC236}">
-                <a16:creationId xmlns:a16="http://schemas.microsoft.com/office/drawing/2014/main" id="{3C673CF6-75ED-4618-978C-98C4BB0D60BC}"/>
-              </a:ext>
-            </a:extLst>
-          </p:cNvPr>
-          <p:cNvSpPr txBox="1"/>
-          <p:nvPr/>
-        </p:nvSpPr>
-        <p:spPr>
-          <a:xfrm>
-            <a:off x="9201106" y="6195410"/>
-            <a:ext cx="829073" cy="244682"/>
-          </a:xfrm>
-          <a:prstGeom prst="rect">
-            <a:avLst/>
-          </a:prstGeom>
-          <a:noFill/>
-        </p:spPr>
-        <p:txBody>
-          <a:bodyPr wrap="none" rtlCol="0">
-            <a:spAutoFit/>
-          </a:bodyPr>
-          <a:lstStyle/>
-          <a:p>
-            <a:r>
-              <a:rPr lang="en-US" sz="990" dirty="0">
-                <a:latin typeface="Arial" panose="020B0604020202020204" pitchFamily="34" charset="0"/>
-                <a:cs typeface="Arial" panose="020B0604020202020204" pitchFamily="34" charset="0"/>
-              </a:rPr>
-              <a:t>File system</a:t>
-            </a:r>
+            <a:endParaRPr lang="en-US" sz="1080" dirty="0">
+              <a:ln w="0"/>
+              <a:solidFill>
+                <a:srgbClr val="3F8624"/>
+              </a:solidFill>
+              <a:latin typeface="Arial" panose="020B0604020202020204" pitchFamily="34" charset="0"/>
+              <a:cs typeface="Arial" panose="020B0604020202020204" pitchFamily="34" charset="0"/>
+            </a:endParaRPr>
           </a:p>
         </p:txBody>
       </p:sp>
@@ -7933,7 +7832,6 @@
           </p:cNvPr>
           <p:cNvCxnSpPr>
             <a:cxnSpLocks/>
-            <a:endCxn id="22" idx="1"/>
           </p:cNvCxnSpPr>
           <p:nvPr/>
         </p:nvCxnSpPr>
@@ -7970,6 +7868,487 @@
           </a:fontRef>
         </p:style>
       </p:cxnSp>
+      <p:pic>
+        <p:nvPicPr>
+          <p:cNvPr id="1026" name="Picture 2">
+            <a:extLst>
+              <a:ext uri="{FF2B5EF4-FFF2-40B4-BE49-F238E27FC236}">
+                <a16:creationId xmlns:a16="http://schemas.microsoft.com/office/drawing/2014/main" id="{B207DAF5-D511-44E6-8296-9122B383EE07}"/>
+              </a:ext>
+            </a:extLst>
+          </p:cNvPr>
+          <p:cNvPicPr>
+            <a:picLocks noChangeAspect="1" noChangeArrowheads="1"/>
+          </p:cNvPicPr>
+          <p:nvPr/>
+        </p:nvPicPr>
+        <p:blipFill>
+          <a:blip r:embed="rId27">
+            <a:extLst>
+              <a:ext uri="{28A0092B-C50C-407E-A947-70E740481C1C}">
+                <a14:useLocalDpi xmlns:a14="http://schemas.microsoft.com/office/drawing/2010/main" val="0"/>
+              </a:ext>
+            </a:extLst>
+          </a:blip>
+          <a:srcRect/>
+          <a:stretch>
+            <a:fillRect/>
+          </a:stretch>
+        </p:blipFill>
+        <p:spPr bwMode="auto">
+          <a:xfrm>
+            <a:off x="8762404" y="4890964"/>
+            <a:ext cx="342785" cy="342785"/>
+          </a:xfrm>
+          <a:prstGeom prst="rect">
+            <a:avLst/>
+          </a:prstGeom>
+          <a:noFill/>
+          <a:extLst>
+            <a:ext uri="{909E8E84-426E-40DD-AFC4-6F175D3DCCD1}">
+              <a14:hiddenFill xmlns:a14="http://schemas.microsoft.com/office/drawing/2010/main">
+                <a:solidFill>
+                  <a:srgbClr val="FFFFFF"/>
+                </a:solidFill>
+              </a14:hiddenFill>
+            </a:ext>
+          </a:extLst>
+        </p:spPr>
+      </p:pic>
+      <p:sp>
+        <p:nvSpPr>
+          <p:cNvPr id="85" name="TextBox 11">
+            <a:extLst>
+              <a:ext uri="{FF2B5EF4-FFF2-40B4-BE49-F238E27FC236}">
+                <a16:creationId xmlns:a16="http://schemas.microsoft.com/office/drawing/2014/main" id="{0355EC56-8BE5-9F4E-BD29-5DC1160E4BC4}"/>
+              </a:ext>
+            </a:extLst>
+          </p:cNvPr>
+          <p:cNvSpPr txBox="1">
+            <a:spLocks noChangeArrowheads="1"/>
+          </p:cNvSpPr>
+          <p:nvPr/>
+        </p:nvSpPr>
+        <p:spPr bwMode="auto">
+          <a:xfrm>
+            <a:off x="9097145" y="4944191"/>
+            <a:ext cx="1146175" cy="549381"/>
+          </a:xfrm>
+          <a:prstGeom prst="rect">
+            <a:avLst/>
+          </a:prstGeom>
+          <a:noFill/>
+          <a:ln>
+            <a:noFill/>
+          </a:ln>
+          <a:extLst>
+            <a:ext uri="{909E8E84-426E-40DD-AFC4-6F175D3DCCD1}">
+              <a14:hiddenFill xmlns:a14="http://schemas.microsoft.com/office/drawing/2010/main">
+                <a:solidFill>
+                  <a:srgbClr val="FFFFFF"/>
+                </a:solidFill>
+              </a14:hiddenFill>
+            </a:ext>
+            <a:ext uri="{91240B29-F687-4F45-9708-019B960494DF}">
+              <a14:hiddenLine xmlns:a14="http://schemas.microsoft.com/office/drawing/2010/main" w="9525">
+                <a:solidFill>
+                  <a:srgbClr val="000000"/>
+                </a:solidFill>
+                <a:miter lim="800000"/>
+                <a:headEnd/>
+                <a:tailEnd/>
+              </a14:hiddenLine>
+            </a:ext>
+          </a:extLst>
+        </p:spPr>
+        <p:txBody>
+          <a:bodyPr wrap="square">
+            <a:spAutoFit/>
+          </a:bodyPr>
+          <a:lstStyle>
+            <a:defPPr>
+              <a:defRPr lang="en-US"/>
+            </a:defPPr>
+            <a:lvl1pPr algn="l" rtl="0" eaLnBrk="0" fontAlgn="base" hangingPunct="0">
+              <a:spcBef>
+                <a:spcPct val="0"/>
+              </a:spcBef>
+              <a:spcAft>
+                <a:spcPct val="0"/>
+              </a:spcAft>
+              <a:defRPr kern="1200">
+                <a:solidFill>
+                  <a:schemeClr val="tx1"/>
+                </a:solidFill>
+                <a:latin typeface="Calibri" panose="020F0502020204030204" pitchFamily="34" charset="0"/>
+                <a:ea typeface="+mn-ea"/>
+                <a:cs typeface="+mn-cs"/>
+              </a:defRPr>
+            </a:lvl1pPr>
+            <a:lvl2pPr marL="457200" algn="l" rtl="0" eaLnBrk="0" fontAlgn="base" hangingPunct="0">
+              <a:spcBef>
+                <a:spcPct val="0"/>
+              </a:spcBef>
+              <a:spcAft>
+                <a:spcPct val="0"/>
+              </a:spcAft>
+              <a:defRPr kern="1200">
+                <a:solidFill>
+                  <a:schemeClr val="tx1"/>
+                </a:solidFill>
+                <a:latin typeface="Calibri" panose="020F0502020204030204" pitchFamily="34" charset="0"/>
+                <a:ea typeface="+mn-ea"/>
+                <a:cs typeface="+mn-cs"/>
+              </a:defRPr>
+            </a:lvl2pPr>
+            <a:lvl3pPr marL="914400" algn="l" rtl="0" eaLnBrk="0" fontAlgn="base" hangingPunct="0">
+              <a:spcBef>
+                <a:spcPct val="0"/>
+              </a:spcBef>
+              <a:spcAft>
+                <a:spcPct val="0"/>
+              </a:spcAft>
+              <a:defRPr kern="1200">
+                <a:solidFill>
+                  <a:schemeClr val="tx1"/>
+                </a:solidFill>
+                <a:latin typeface="Calibri" panose="020F0502020204030204" pitchFamily="34" charset="0"/>
+                <a:ea typeface="+mn-ea"/>
+                <a:cs typeface="+mn-cs"/>
+              </a:defRPr>
+            </a:lvl3pPr>
+            <a:lvl4pPr marL="1371600" algn="l" rtl="0" eaLnBrk="0" fontAlgn="base" hangingPunct="0">
+              <a:spcBef>
+                <a:spcPct val="0"/>
+              </a:spcBef>
+              <a:spcAft>
+                <a:spcPct val="0"/>
+              </a:spcAft>
+              <a:defRPr kern="1200">
+                <a:solidFill>
+                  <a:schemeClr val="tx1"/>
+                </a:solidFill>
+                <a:latin typeface="Calibri" panose="020F0502020204030204" pitchFamily="34" charset="0"/>
+                <a:ea typeface="+mn-ea"/>
+                <a:cs typeface="+mn-cs"/>
+              </a:defRPr>
+            </a:lvl4pPr>
+            <a:lvl5pPr marL="1828800" algn="l" rtl="0" eaLnBrk="0" fontAlgn="base" hangingPunct="0">
+              <a:spcBef>
+                <a:spcPct val="0"/>
+              </a:spcBef>
+              <a:spcAft>
+                <a:spcPct val="0"/>
+              </a:spcAft>
+              <a:defRPr kern="1200">
+                <a:solidFill>
+                  <a:schemeClr val="tx1"/>
+                </a:solidFill>
+                <a:latin typeface="Calibri" panose="020F0502020204030204" pitchFamily="34" charset="0"/>
+                <a:ea typeface="+mn-ea"/>
+                <a:cs typeface="+mn-cs"/>
+              </a:defRPr>
+            </a:lvl5pPr>
+            <a:lvl6pPr marL="2286000" algn="l" defTabSz="914400" rtl="0" eaLnBrk="1" latinLnBrk="0" hangingPunct="1">
+              <a:defRPr kern="1200">
+                <a:solidFill>
+                  <a:schemeClr val="tx1"/>
+                </a:solidFill>
+                <a:latin typeface="Calibri" panose="020F0502020204030204" pitchFamily="34" charset="0"/>
+                <a:ea typeface="+mn-ea"/>
+                <a:cs typeface="+mn-cs"/>
+              </a:defRPr>
+            </a:lvl6pPr>
+            <a:lvl7pPr marL="2743200" algn="l" defTabSz="914400" rtl="0" eaLnBrk="1" latinLnBrk="0" hangingPunct="1">
+              <a:defRPr kern="1200">
+                <a:solidFill>
+                  <a:schemeClr val="tx1"/>
+                </a:solidFill>
+                <a:latin typeface="Calibri" panose="020F0502020204030204" pitchFamily="34" charset="0"/>
+                <a:ea typeface="+mn-ea"/>
+                <a:cs typeface="+mn-cs"/>
+              </a:defRPr>
+            </a:lvl7pPr>
+            <a:lvl8pPr marL="3200400" algn="l" defTabSz="914400" rtl="0" eaLnBrk="1" latinLnBrk="0" hangingPunct="1">
+              <a:defRPr kern="1200">
+                <a:solidFill>
+                  <a:schemeClr val="tx1"/>
+                </a:solidFill>
+                <a:latin typeface="Calibri" panose="020F0502020204030204" pitchFamily="34" charset="0"/>
+                <a:ea typeface="+mn-ea"/>
+                <a:cs typeface="+mn-cs"/>
+              </a:defRPr>
+            </a:lvl8pPr>
+            <a:lvl9pPr marL="3657600" algn="l" defTabSz="914400" rtl="0" eaLnBrk="1" latinLnBrk="0" hangingPunct="1">
+              <a:defRPr kern="1200">
+                <a:solidFill>
+                  <a:schemeClr val="tx1"/>
+                </a:solidFill>
+                <a:latin typeface="Calibri" panose="020F0502020204030204" pitchFamily="34" charset="0"/>
+                <a:ea typeface="+mn-ea"/>
+                <a:cs typeface="+mn-cs"/>
+              </a:defRPr>
+            </a:lvl9pPr>
+          </a:lstStyle>
+          <a:p>
+            <a:pPr algn="ctr" eaLnBrk="1" hangingPunct="1"/>
+            <a:r>
+              <a:rPr lang="en-US" altLang="en-US" sz="990" dirty="0">
+                <a:latin typeface="Arial" panose="020B0604020202020204" pitchFamily="34" charset="0"/>
+                <a:ea typeface="Amazon Ember" panose="020B0603020204020204" pitchFamily="34" charset="0"/>
+                <a:cs typeface="Arial" panose="020B0604020202020204" pitchFamily="34" charset="0"/>
+              </a:rPr>
+              <a:t>Amazon Elastic File System (Amazon EFS)</a:t>
+            </a:r>
+          </a:p>
+        </p:txBody>
+      </p:sp>
+      <p:pic>
+        <p:nvPicPr>
+          <p:cNvPr id="87" name="Graphic 27">
+            <a:extLst>
+              <a:ext uri="{FF2B5EF4-FFF2-40B4-BE49-F238E27FC236}">
+                <a16:creationId xmlns:a16="http://schemas.microsoft.com/office/drawing/2014/main" id="{CB66B69F-9B64-254B-9239-69CF66F18ADF}"/>
+              </a:ext>
+            </a:extLst>
+          </p:cNvPr>
+          <p:cNvPicPr>
+            <a:picLocks noChangeAspect="1" noChangeArrowheads="1"/>
+          </p:cNvPicPr>
+          <p:nvPr/>
+        </p:nvPicPr>
+        <p:blipFill>
+          <a:blip r:embed="rId28">
+            <a:extLst>
+              <a:ext uri="{96DAC541-7B7A-43D3-8B79-37D633B846F1}">
+                <asvg:svgBlip xmlns:asvg="http://schemas.microsoft.com/office/drawing/2016/SVG/main" r:embed="rId29"/>
+              </a:ext>
+            </a:extLst>
+          </a:blip>
+          <a:srcRect/>
+          <a:stretch/>
+        </p:blipFill>
+        <p:spPr bwMode="auto">
+          <a:xfrm>
+            <a:off x="9258572" y="5779719"/>
+            <a:ext cx="457200" cy="457200"/>
+          </a:xfrm>
+          <a:prstGeom prst="rect">
+            <a:avLst/>
+          </a:prstGeom>
+          <a:noFill/>
+          <a:ln>
+            <a:noFill/>
+          </a:ln>
+          <a:extLst>
+            <a:ext uri="{909E8E84-426E-40DD-AFC4-6F175D3DCCD1}">
+              <a14:hiddenFill xmlns:a14="http://schemas.microsoft.com/office/drawing/2010/main">
+                <a:solidFill>
+                  <a:srgbClr val="FFFFFF"/>
+                </a:solidFill>
+              </a14:hiddenFill>
+            </a:ext>
+            <a:ext uri="{91240B29-F687-4F45-9708-019B960494DF}">
+              <a14:hiddenLine xmlns:a14="http://schemas.microsoft.com/office/drawing/2010/main" w="9525">
+                <a:solidFill>
+                  <a:srgbClr val="000000"/>
+                </a:solidFill>
+                <a:miter lim="800000"/>
+                <a:headEnd/>
+                <a:tailEnd/>
+              </a14:hiddenLine>
+            </a:ext>
+          </a:extLst>
+        </p:spPr>
+      </p:pic>
+      <p:sp>
+        <p:nvSpPr>
+          <p:cNvPr id="88" name="TextBox 23">
+            <a:extLst>
+              <a:ext uri="{FF2B5EF4-FFF2-40B4-BE49-F238E27FC236}">
+                <a16:creationId xmlns:a16="http://schemas.microsoft.com/office/drawing/2014/main" id="{1224D663-033A-B749-8BEC-8D390EC933B7}"/>
+              </a:ext>
+            </a:extLst>
+          </p:cNvPr>
+          <p:cNvSpPr txBox="1">
+            <a:spLocks noChangeArrowheads="1"/>
+          </p:cNvSpPr>
+          <p:nvPr/>
+        </p:nvSpPr>
+        <p:spPr bwMode="auto">
+          <a:xfrm>
+            <a:off x="8950968" y="6228647"/>
+            <a:ext cx="1146178" cy="244682"/>
+          </a:xfrm>
+          <a:prstGeom prst="rect">
+            <a:avLst/>
+          </a:prstGeom>
+          <a:noFill/>
+          <a:ln>
+            <a:noFill/>
+          </a:ln>
+          <a:extLst>
+            <a:ext uri="{909E8E84-426E-40DD-AFC4-6F175D3DCCD1}">
+              <a14:hiddenFill xmlns:a14="http://schemas.microsoft.com/office/drawing/2010/main">
+                <a:solidFill>
+                  <a:srgbClr val="FFFFFF"/>
+                </a:solidFill>
+              </a14:hiddenFill>
+            </a:ext>
+            <a:ext uri="{91240B29-F687-4F45-9708-019B960494DF}">
+              <a14:hiddenLine xmlns:a14="http://schemas.microsoft.com/office/drawing/2010/main" w="9525">
+                <a:solidFill>
+                  <a:srgbClr val="000000"/>
+                </a:solidFill>
+                <a:miter lim="800000"/>
+                <a:headEnd/>
+                <a:tailEnd/>
+              </a14:hiddenLine>
+            </a:ext>
+          </a:extLst>
+        </p:spPr>
+        <p:txBody>
+          <a:bodyPr wrap="square">
+            <a:spAutoFit/>
+          </a:bodyPr>
+          <a:lstStyle>
+            <a:defPPr>
+              <a:defRPr lang="en-US"/>
+            </a:defPPr>
+            <a:lvl1pPr algn="l" rtl="0" eaLnBrk="0" fontAlgn="base" hangingPunct="0">
+              <a:spcBef>
+                <a:spcPct val="0"/>
+              </a:spcBef>
+              <a:spcAft>
+                <a:spcPct val="0"/>
+              </a:spcAft>
+              <a:defRPr kern="1200">
+                <a:solidFill>
+                  <a:schemeClr val="tx1"/>
+                </a:solidFill>
+                <a:latin typeface="Calibri" panose="020F0502020204030204" pitchFamily="34" charset="0"/>
+                <a:ea typeface="+mn-ea"/>
+                <a:cs typeface="+mn-cs"/>
+              </a:defRPr>
+            </a:lvl1pPr>
+            <a:lvl2pPr marL="457200" algn="l" rtl="0" eaLnBrk="0" fontAlgn="base" hangingPunct="0">
+              <a:spcBef>
+                <a:spcPct val="0"/>
+              </a:spcBef>
+              <a:spcAft>
+                <a:spcPct val="0"/>
+              </a:spcAft>
+              <a:defRPr kern="1200">
+                <a:solidFill>
+                  <a:schemeClr val="tx1"/>
+                </a:solidFill>
+                <a:latin typeface="Calibri" panose="020F0502020204030204" pitchFamily="34" charset="0"/>
+                <a:ea typeface="+mn-ea"/>
+                <a:cs typeface="+mn-cs"/>
+              </a:defRPr>
+            </a:lvl2pPr>
+            <a:lvl3pPr marL="914400" algn="l" rtl="0" eaLnBrk="0" fontAlgn="base" hangingPunct="0">
+              <a:spcBef>
+                <a:spcPct val="0"/>
+              </a:spcBef>
+              <a:spcAft>
+                <a:spcPct val="0"/>
+              </a:spcAft>
+              <a:defRPr kern="1200">
+                <a:solidFill>
+                  <a:schemeClr val="tx1"/>
+                </a:solidFill>
+                <a:latin typeface="Calibri" panose="020F0502020204030204" pitchFamily="34" charset="0"/>
+                <a:ea typeface="+mn-ea"/>
+                <a:cs typeface="+mn-cs"/>
+              </a:defRPr>
+            </a:lvl3pPr>
+            <a:lvl4pPr marL="1371600" algn="l" rtl="0" eaLnBrk="0" fontAlgn="base" hangingPunct="0">
+              <a:spcBef>
+                <a:spcPct val="0"/>
+              </a:spcBef>
+              <a:spcAft>
+                <a:spcPct val="0"/>
+              </a:spcAft>
+              <a:defRPr kern="1200">
+                <a:solidFill>
+                  <a:schemeClr val="tx1"/>
+                </a:solidFill>
+                <a:latin typeface="Calibri" panose="020F0502020204030204" pitchFamily="34" charset="0"/>
+                <a:ea typeface="+mn-ea"/>
+                <a:cs typeface="+mn-cs"/>
+              </a:defRPr>
+            </a:lvl4pPr>
+            <a:lvl5pPr marL="1828800" algn="l" rtl="0" eaLnBrk="0" fontAlgn="base" hangingPunct="0">
+              <a:spcBef>
+                <a:spcPct val="0"/>
+              </a:spcBef>
+              <a:spcAft>
+                <a:spcPct val="0"/>
+              </a:spcAft>
+              <a:defRPr kern="1200">
+                <a:solidFill>
+                  <a:schemeClr val="tx1"/>
+                </a:solidFill>
+                <a:latin typeface="Calibri" panose="020F0502020204030204" pitchFamily="34" charset="0"/>
+                <a:ea typeface="+mn-ea"/>
+                <a:cs typeface="+mn-cs"/>
+              </a:defRPr>
+            </a:lvl5pPr>
+            <a:lvl6pPr marL="2286000" algn="l" defTabSz="914400" rtl="0" eaLnBrk="1" latinLnBrk="0" hangingPunct="1">
+              <a:defRPr kern="1200">
+                <a:solidFill>
+                  <a:schemeClr val="tx1"/>
+                </a:solidFill>
+                <a:latin typeface="Calibri" panose="020F0502020204030204" pitchFamily="34" charset="0"/>
+                <a:ea typeface="+mn-ea"/>
+                <a:cs typeface="+mn-cs"/>
+              </a:defRPr>
+            </a:lvl6pPr>
+            <a:lvl7pPr marL="2743200" algn="l" defTabSz="914400" rtl="0" eaLnBrk="1" latinLnBrk="0" hangingPunct="1">
+              <a:defRPr kern="1200">
+                <a:solidFill>
+                  <a:schemeClr val="tx1"/>
+                </a:solidFill>
+                <a:latin typeface="Calibri" panose="020F0502020204030204" pitchFamily="34" charset="0"/>
+                <a:ea typeface="+mn-ea"/>
+                <a:cs typeface="+mn-cs"/>
+              </a:defRPr>
+            </a:lvl7pPr>
+            <a:lvl8pPr marL="3200400" algn="l" defTabSz="914400" rtl="0" eaLnBrk="1" latinLnBrk="0" hangingPunct="1">
+              <a:defRPr kern="1200">
+                <a:solidFill>
+                  <a:schemeClr val="tx1"/>
+                </a:solidFill>
+                <a:latin typeface="Calibri" panose="020F0502020204030204" pitchFamily="34" charset="0"/>
+                <a:ea typeface="+mn-ea"/>
+                <a:cs typeface="+mn-cs"/>
+              </a:defRPr>
+            </a:lvl8pPr>
+            <a:lvl9pPr marL="3657600" algn="l" defTabSz="914400" rtl="0" eaLnBrk="1" latinLnBrk="0" hangingPunct="1">
+              <a:defRPr kern="1200">
+                <a:solidFill>
+                  <a:schemeClr val="tx1"/>
+                </a:solidFill>
+                <a:latin typeface="Calibri" panose="020F0502020204030204" pitchFamily="34" charset="0"/>
+                <a:ea typeface="+mn-ea"/>
+                <a:cs typeface="+mn-cs"/>
+              </a:defRPr>
+            </a:lvl9pPr>
+          </a:lstStyle>
+          <a:p>
+            <a:pPr algn="ctr" eaLnBrk="1" hangingPunct="1"/>
+            <a:r>
+              <a:rPr lang="en-US" altLang="en-US" sz="990" dirty="0">
+                <a:latin typeface="Arial" panose="020B0604020202020204" pitchFamily="34" charset="0"/>
+                <a:ea typeface="Amazon Ember" panose="020B0603020204020204" pitchFamily="34" charset="0"/>
+                <a:cs typeface="Arial" panose="020B0604020202020204" pitchFamily="34" charset="0"/>
+              </a:rPr>
+              <a:t>File system</a:t>
+            </a:r>
+          </a:p>
+        </p:txBody>
+      </p:sp>
     </p:spTree>
     <p:extLst>
       <p:ext uri="{BB962C8B-B14F-4D97-AF65-F5344CB8AC3E}">

</xml_diff>